<commit_message>
updated redeemed text preprocessing
</commit_message>
<xml_diff>
--- a/Project/deliverables/methodology_update/Assignment_7_Grace_O'Malley.pptx
+++ b/Project/deliverables/methodology_update/Assignment_7_Grace_O'Malley.pptx
@@ -110,6 +110,11 @@
       </a:defRPr>
     </a:lvl9pPr>
   </p:defaultTextStyle>
+  <p:extLst>
+    <p:ext uri="{EFAFB233-063F-42B5-8137-9DF3F51BA10A}">
+      <p15:sldGuideLst xmlns:p15="http://schemas.microsoft.com/office/powerpoint/2012/main"/>
+    </p:ext>
+  </p:extLst>
 </p:presentation>
 </file>
 
@@ -119,6 +124,35 @@
     <p1510:client id="{CCFCB119-94C2-504D-BD10-52159EA936ED}" v="22" dt="2025-04-08T12:36:44.393"/>
   </p1510:revLst>
 </p1510:revInfo>
+</file>
+
+<file path=ppt/changesInfos/changesInfo1.xml><?xml version="1.0" encoding="utf-8"?>
+<pc:chgInfo xmlns:a="http://schemas.openxmlformats.org/drawingml/2006/main" xmlns:r="http://schemas.openxmlformats.org/officeDocument/2006/relationships" xmlns:ac="http://schemas.microsoft.com/office/drawing/2013/main/command" xmlns:pc="http://schemas.microsoft.com/office/powerpoint/2013/main/command">
+  <pc:docChgLst>
+    <pc:chgData name="Conor O’Malley" userId="7f1e2f7a85897ce2" providerId="LiveId" clId="{CCFCB119-94C2-504D-BD10-52159EA936ED}"/>
+    <pc:docChg chg="modSld">
+      <pc:chgData name="Conor O’Malley" userId="7f1e2f7a85897ce2" providerId="LiveId" clId="{CCFCB119-94C2-504D-BD10-52159EA936ED}" dt="2025-04-09T00:09:01.248" v="18" actId="20577"/>
+      <pc:docMkLst>
+        <pc:docMk/>
+      </pc:docMkLst>
+      <pc:sldChg chg="modSp mod">
+        <pc:chgData name="Conor O’Malley" userId="7f1e2f7a85897ce2" providerId="LiveId" clId="{CCFCB119-94C2-504D-BD10-52159EA936ED}" dt="2025-04-09T00:09:01.248" v="18" actId="20577"/>
+        <pc:sldMkLst>
+          <pc:docMk/>
+          <pc:sldMk cId="958133038" sldId="2589"/>
+        </pc:sldMkLst>
+        <pc:graphicFrameChg chg="modGraphic">
+          <ac:chgData name="Conor O’Malley" userId="7f1e2f7a85897ce2" providerId="LiveId" clId="{CCFCB119-94C2-504D-BD10-52159EA936ED}" dt="2025-04-09T00:09:01.248" v="18" actId="20577"/>
+          <ac:graphicFrameMkLst>
+            <pc:docMk/>
+            <pc:sldMk cId="958133038" sldId="2589"/>
+            <ac:graphicFrameMk id="4" creationId="{F67B03B1-AB98-B808-01FB-E98EFEF0D0E0}"/>
+          </ac:graphicFrameMkLst>
+        </pc:graphicFrameChg>
+      </pc:sldChg>
+    </pc:docChg>
+  </pc:docChgLst>
+</pc:chgInfo>
 </file>
 
 <file path=ppt/handoutMasters/handoutMaster1.xml><?xml version="1.0" encoding="utf-8"?>
@@ -4218,7 +4252,7 @@
             <p:ph idx="1"/>
             <p:extLst>
               <p:ext uri="{D42A27DB-BD31-4B8C-83A1-F6EECF244321}">
-                <p14:modId xmlns:p14="http://schemas.microsoft.com/office/powerpoint/2010/main" val="427112282"/>
+                <p14:modId xmlns:p14="http://schemas.microsoft.com/office/powerpoint/2010/main" val="2728108697"/>
               </p:ext>
             </p:extLst>
           </p:nvPr>
@@ -5174,7 +5208,7 @@
                     <a:p>
                       <a:r>
                         <a:rPr lang="en-US" sz="1100" dirty="0"/>
-                        <a:t>N/A</a:t>
+                        <a:t>Confusion Matrix</a:t>
                       </a:r>
                     </a:p>
                   </a:txBody>

</xml_diff>